<commit_message>
Updated ppt and changed the namespaces
</commit_message>
<xml_diff>
--- a/2022-SUM/Week01.pptx
+++ b/2022-SUM/Week01.pptx
@@ -8,19 +8,21 @@
     <p:sldId id="256" r:id="rId2"/>
     <p:sldId id="261" r:id="rId3"/>
     <p:sldId id="258" r:id="rId4"/>
-    <p:sldId id="259" r:id="rId5"/>
-    <p:sldId id="257" r:id="rId6"/>
-    <p:sldId id="272" r:id="rId7"/>
-    <p:sldId id="267" r:id="rId8"/>
-    <p:sldId id="262" r:id="rId9"/>
-    <p:sldId id="263" r:id="rId10"/>
-    <p:sldId id="264" r:id="rId11"/>
-    <p:sldId id="265" r:id="rId12"/>
-    <p:sldId id="270" r:id="rId13"/>
-    <p:sldId id="271" r:id="rId14"/>
-    <p:sldId id="266" r:id="rId15"/>
-    <p:sldId id="268" r:id="rId16"/>
-    <p:sldId id="269" r:id="rId17"/>
+    <p:sldId id="273" r:id="rId5"/>
+    <p:sldId id="259" r:id="rId6"/>
+    <p:sldId id="274" r:id="rId7"/>
+    <p:sldId id="257" r:id="rId8"/>
+    <p:sldId id="272" r:id="rId9"/>
+    <p:sldId id="267" r:id="rId10"/>
+    <p:sldId id="262" r:id="rId11"/>
+    <p:sldId id="263" r:id="rId12"/>
+    <p:sldId id="264" r:id="rId13"/>
+    <p:sldId id="265" r:id="rId14"/>
+    <p:sldId id="270" r:id="rId15"/>
+    <p:sldId id="271" r:id="rId16"/>
+    <p:sldId id="266" r:id="rId17"/>
+    <p:sldId id="268" r:id="rId18"/>
+    <p:sldId id="269" r:id="rId19"/>
   </p:sldIdLst>
   <p:sldSz cx="12192000" cy="6858000"/>
   <p:notesSz cx="6858000" cy="9144000"/>
@@ -274,7 +276,7 @@
           <a:p>
             <a:fld id="{2B1919C7-6BC3-4736-AC32-A62C7B81C82C}" type="datetimeFigureOut">
               <a:rPr lang="en-US" smtClean="0"/>
-              <a:t>5/23/2022</a:t>
+              <a:t>5/24/2022</a:t>
             </a:fld>
             <a:endParaRPr lang="en-US"/>
           </a:p>
@@ -472,7 +474,7 @@
           <a:p>
             <a:fld id="{2B1919C7-6BC3-4736-AC32-A62C7B81C82C}" type="datetimeFigureOut">
               <a:rPr lang="en-US" smtClean="0"/>
-              <a:t>5/23/2022</a:t>
+              <a:t>5/24/2022</a:t>
             </a:fld>
             <a:endParaRPr lang="en-US"/>
           </a:p>
@@ -680,7 +682,7 @@
           <a:p>
             <a:fld id="{2B1919C7-6BC3-4736-AC32-A62C7B81C82C}" type="datetimeFigureOut">
               <a:rPr lang="en-US" smtClean="0"/>
-              <a:t>5/23/2022</a:t>
+              <a:t>5/24/2022</a:t>
             </a:fld>
             <a:endParaRPr lang="en-US"/>
           </a:p>
@@ -878,7 +880,7 @@
           <a:p>
             <a:fld id="{2B1919C7-6BC3-4736-AC32-A62C7B81C82C}" type="datetimeFigureOut">
               <a:rPr lang="en-US" smtClean="0"/>
-              <a:t>5/23/2022</a:t>
+              <a:t>5/24/2022</a:t>
             </a:fld>
             <a:endParaRPr lang="en-US"/>
           </a:p>
@@ -1153,7 +1155,7 @@
           <a:p>
             <a:fld id="{2B1919C7-6BC3-4736-AC32-A62C7B81C82C}" type="datetimeFigureOut">
               <a:rPr lang="en-US" smtClean="0"/>
-              <a:t>5/23/2022</a:t>
+              <a:t>5/24/2022</a:t>
             </a:fld>
             <a:endParaRPr lang="en-US"/>
           </a:p>
@@ -1418,7 +1420,7 @@
           <a:p>
             <a:fld id="{2B1919C7-6BC3-4736-AC32-A62C7B81C82C}" type="datetimeFigureOut">
               <a:rPr lang="en-US" smtClean="0"/>
-              <a:t>5/23/2022</a:t>
+              <a:t>5/24/2022</a:t>
             </a:fld>
             <a:endParaRPr lang="en-US"/>
           </a:p>
@@ -1830,7 +1832,7 @@
           <a:p>
             <a:fld id="{2B1919C7-6BC3-4736-AC32-A62C7B81C82C}" type="datetimeFigureOut">
               <a:rPr lang="en-US" smtClean="0"/>
-              <a:t>5/23/2022</a:t>
+              <a:t>5/24/2022</a:t>
             </a:fld>
             <a:endParaRPr lang="en-US"/>
           </a:p>
@@ -1971,7 +1973,7 @@
           <a:p>
             <a:fld id="{2B1919C7-6BC3-4736-AC32-A62C7B81C82C}" type="datetimeFigureOut">
               <a:rPr lang="en-US" smtClean="0"/>
-              <a:t>5/23/2022</a:t>
+              <a:t>5/24/2022</a:t>
             </a:fld>
             <a:endParaRPr lang="en-US"/>
           </a:p>
@@ -2084,7 +2086,7 @@
           <a:p>
             <a:fld id="{2B1919C7-6BC3-4736-AC32-A62C7B81C82C}" type="datetimeFigureOut">
               <a:rPr lang="en-US" smtClean="0"/>
-              <a:t>5/23/2022</a:t>
+              <a:t>5/24/2022</a:t>
             </a:fld>
             <a:endParaRPr lang="en-US"/>
           </a:p>
@@ -2395,7 +2397,7 @@
           <a:p>
             <a:fld id="{2B1919C7-6BC3-4736-AC32-A62C7B81C82C}" type="datetimeFigureOut">
               <a:rPr lang="en-US" smtClean="0"/>
-              <a:t>5/23/2022</a:t>
+              <a:t>5/24/2022</a:t>
             </a:fld>
             <a:endParaRPr lang="en-US"/>
           </a:p>
@@ -2683,7 +2685,7 @@
           <a:p>
             <a:fld id="{2B1919C7-6BC3-4736-AC32-A62C7B81C82C}" type="datetimeFigureOut">
               <a:rPr lang="en-US" smtClean="0"/>
-              <a:t>5/23/2022</a:t>
+              <a:t>5/24/2022</a:t>
             </a:fld>
             <a:endParaRPr lang="en-US"/>
           </a:p>
@@ -2924,7 +2926,7 @@
           <a:p>
             <a:fld id="{2B1919C7-6BC3-4736-AC32-A62C7B81C82C}" type="datetimeFigureOut">
               <a:rPr lang="en-US" smtClean="0"/>
-              <a:t>5/23/2022</a:t>
+              <a:t>5/24/2022</a:t>
             </a:fld>
             <a:endParaRPr lang="en-US"/>
           </a:p>
@@ -3456,7 +3458,7 @@
           <p:cNvPr id="2" name="Title 1">
             <a:extLst>
               <a:ext uri="{FF2B5EF4-FFF2-40B4-BE49-F238E27FC236}">
-                <a16:creationId xmlns:a16="http://schemas.microsoft.com/office/drawing/2014/main" id="{0913D910-9A05-4549-9611-8D7A36D0DDE9}"/>
+                <a16:creationId xmlns:a16="http://schemas.microsoft.com/office/drawing/2014/main" id="{B196A59B-5282-4A6B-9665-B698AF5B8C11}"/>
               </a:ext>
             </a:extLst>
           </p:cNvPr>
@@ -3474,7 +3476,7 @@
           <a:p>
             <a:r>
               <a:rPr lang="en-US" dirty="0"/>
-              <a:t>ASP.NET Core (Mod 0: Topic 6)</a:t>
+              <a:t>Software (Mod 0 Topic 4)</a:t>
             </a:r>
           </a:p>
         </p:txBody>
@@ -3484,7 +3486,7 @@
           <p:cNvPr id="3" name="Content Placeholder 2">
             <a:extLst>
               <a:ext uri="{FF2B5EF4-FFF2-40B4-BE49-F238E27FC236}">
-                <a16:creationId xmlns:a16="http://schemas.microsoft.com/office/drawing/2014/main" id="{414D80AC-8137-41F4-AEB8-C409CE6131FA}"/>
+                <a16:creationId xmlns:a16="http://schemas.microsoft.com/office/drawing/2014/main" id="{FDBD4078-CACF-41A7-9919-EE36CBA17F5C}"/>
               </a:ext>
             </a:extLst>
           </p:cNvPr>
@@ -3497,90 +3499,45 @@
         </p:nvSpPr>
         <p:spPr/>
         <p:txBody>
-          <a:bodyPr>
-            <a:normAutofit fontScale="92500" lnSpcReduction="20000"/>
-          </a:bodyPr>
-          <a:lstStyle/>
-          <a:p>
-            <a:r>
-              <a:rPr lang="en-US" dirty="0"/>
-              <a:t>2002: ASP.NET Web Forms</a:t>
+          <a:bodyPr/>
+          <a:lstStyle/>
+          <a:p>
+            <a:r>
+              <a:rPr lang="en-US" dirty="0"/>
+              <a:t>Visual Studio 2019 (or 2022)</a:t>
             </a:r>
           </a:p>
           <a:p>
             <a:pPr lvl="1"/>
             <a:r>
               <a:rPr lang="en-US" dirty="0"/>
-              <a:t>Provided rapid development similar to Windows Forms</a:t>
-            </a:r>
-          </a:p>
-          <a:p>
-            <a:r>
-              <a:rPr lang="en-US" dirty="0"/>
-              <a:t>2007: ASP.NET MVC</a:t>
+              <a:t>Community is free</a:t>
+            </a:r>
+          </a:p>
+          <a:p>
+            <a:r>
+              <a:rPr lang="en-US" dirty="0"/>
+              <a:t>GitHub</a:t>
             </a:r>
           </a:p>
           <a:p>
             <a:pPr lvl="1"/>
             <a:r>
               <a:rPr lang="en-US" dirty="0"/>
-              <a:t>Used the MVC patters (separation of concerns, etc.)</a:t>
+              <a:t>Needs to be public</a:t>
+            </a:r>
+          </a:p>
+          <a:p>
+            <a:r>
+              <a:rPr lang="en-US" dirty="0"/>
+              <a:t>MS SQL Express</a:t>
             </a:r>
           </a:p>
           <a:p>
             <a:pPr lvl="1"/>
             <a:r>
               <a:rPr lang="en-US" dirty="0"/>
-              <a:t>Still runs on proprietary ASP.NET Framework</a:t>
-            </a:r>
-          </a:p>
-          <a:p>
-            <a:r>
-              <a:rPr lang="en-US" dirty="0"/>
-              <a:t>2015: ASP.NET Core MVC</a:t>
-            </a:r>
-          </a:p>
-          <a:p>
-            <a:pPr lvl="1"/>
-            <a:r>
-              <a:rPr lang="en-US" dirty="0"/>
-              <a:t>Runs on ASP.NET Core Framework (open source)</a:t>
-            </a:r>
-          </a:p>
-          <a:p>
-            <a:pPr lvl="1"/>
-            <a:r>
-              <a:rPr lang="en-US" dirty="0"/>
-              <a:t>“Merged” ASP.NET MVC and ASP.NET Web </a:t>
-            </a:r>
-            <a:r>
-              <a:rPr lang="en-US" dirty="0" err="1"/>
-              <a:t>Api</a:t>
-            </a:r>
-            <a:endParaRPr lang="en-US" dirty="0"/>
-          </a:p>
-          <a:p>
-            <a:pPr lvl="1"/>
-            <a:r>
-              <a:rPr lang="en-US" dirty="0"/>
-              <a:t>V1 released 2016</a:t>
-            </a:r>
-          </a:p>
-          <a:p>
-            <a:pPr lvl="1"/>
-            <a:endParaRPr lang="en-US" dirty="0"/>
-          </a:p>
-          <a:p>
-            <a:r>
-              <a:rPr lang="en-US" dirty="0"/>
-              <a:t>.NET Framework/.NET Core/Microsoft hates numbers</a:t>
-            </a:r>
-          </a:p>
-          <a:p>
-            <a:pPr lvl="1"/>
-            <a:r>
-              <a:rPr lang="en-US" dirty="0"/>
-              <a:t>.NET Framework + .NET Core =&gt; .NET 6</a:t>
+              <a:t>Developer Edition is free</a:t>
             </a:r>
           </a:p>
         </p:txBody>
@@ -3588,7 +3545,7 @@
     </p:spTree>
     <p:extLst>
       <p:ext uri="{BB962C8B-B14F-4D97-AF65-F5344CB8AC3E}">
-        <p14:creationId xmlns:p14="http://schemas.microsoft.com/office/powerpoint/2010/main" val="2543742822"/>
+        <p14:creationId xmlns:p14="http://schemas.microsoft.com/office/powerpoint/2010/main" val="2039993251"/>
       </p:ext>
     </p:extLst>
   </p:cSld>
@@ -3620,7 +3577,7 @@
           <p:cNvPr id="2" name="Title 1">
             <a:extLst>
               <a:ext uri="{FF2B5EF4-FFF2-40B4-BE49-F238E27FC236}">
-                <a16:creationId xmlns:a16="http://schemas.microsoft.com/office/drawing/2014/main" id="{3FD3C42F-B963-48FE-A614-759D4D5E77F9}"/>
+                <a16:creationId xmlns:a16="http://schemas.microsoft.com/office/drawing/2014/main" id="{84792096-D960-4A7A-997B-172F0E73A3F0}"/>
               </a:ext>
             </a:extLst>
           </p:cNvPr>
@@ -3638,7 +3595,7 @@
           <a:p>
             <a:r>
               <a:rPr lang="en-US" dirty="0"/>
-              <a:t>Model View Controller (Mod 1: Topic 1)</a:t>
+              <a:t>First ASP.NET Core Application (Topic 5)</a:t>
             </a:r>
           </a:p>
         </p:txBody>
@@ -3648,7 +3605,7 @@
           <p:cNvPr id="3" name="Content Placeholder 2">
             <a:extLst>
               <a:ext uri="{FF2B5EF4-FFF2-40B4-BE49-F238E27FC236}">
-                <a16:creationId xmlns:a16="http://schemas.microsoft.com/office/drawing/2014/main" id="{0801C3CC-CF77-449B-88DB-CAA4B736478C}"/>
+                <a16:creationId xmlns:a16="http://schemas.microsoft.com/office/drawing/2014/main" id="{C4430072-25B9-4686-BC36-4F9624C77AC7}"/>
               </a:ext>
             </a:extLst>
           </p:cNvPr>
@@ -3666,13 +3623,33 @@
           <a:p>
             <a:r>
               <a:rPr lang="en-US" dirty="0"/>
-              <a:t>Model View Controller (MVC)</a:t>
+              <a:t>Visual Studio: Getting Started</a:t>
             </a:r>
           </a:p>
           <a:p>
             <a:pPr lvl="1"/>
             <a:r>
               <a:rPr lang="en-US" dirty="0"/>
+              <a:t>Create a new project</a:t>
+            </a:r>
+          </a:p>
+          <a:p>
+            <a:pPr lvl="1"/>
+            <a:r>
+              <a:rPr lang="en-US" dirty="0"/>
+              <a:t>ASP.NET Core Web Application</a:t>
+            </a:r>
+          </a:p>
+          <a:p>
+            <a:r>
+              <a:rPr lang="en-US" dirty="0"/>
+              <a:t>Model/View/Controller</a:t>
+            </a:r>
+          </a:p>
+          <a:p>
+            <a:pPr lvl="1"/>
+            <a:r>
+              <a:rPr lang="en-US" dirty="0"/>
               <a:t>Model: Consists of the code that provides the data access and business logic</a:t>
             </a:r>
           </a:p>
@@ -3688,33 +3665,6 @@
             <a:r>
               <a:rPr lang="en-US" dirty="0"/>
               <a:t>Controller: Consist of the code that receives requests from users, gets the appropriate data and stores it in the model, and passes the model to the appropriate view</a:t>
-            </a:r>
-          </a:p>
-          <a:p>
-            <a:r>
-              <a:rPr lang="en-US" dirty="0"/>
-              <a:t>“Separation of duties”</a:t>
-            </a:r>
-          </a:p>
-          <a:p>
-            <a:pPr lvl="1"/>
-            <a:r>
-              <a:rPr lang="en-US" dirty="0"/>
-              <a:t>Keep your data (database, webservice, etc.) separate from how you display your data</a:t>
-            </a:r>
-          </a:p>
-          <a:p>
-            <a:pPr lvl="1"/>
-            <a:r>
-              <a:rPr lang="en-US" dirty="0"/>
-              <a:t>Easy to test</a:t>
-            </a:r>
-          </a:p>
-          <a:p>
-            <a:pPr lvl="1"/>
-            <a:r>
-              <a:rPr lang="en-US" dirty="0"/>
-              <a:t>“Easy” to change either the UI or the Database</a:t>
             </a:r>
           </a:p>
         </p:txBody>
@@ -3722,7 +3672,7 @@
     </p:spTree>
     <p:extLst>
       <p:ext uri="{BB962C8B-B14F-4D97-AF65-F5344CB8AC3E}">
-        <p14:creationId xmlns:p14="http://schemas.microsoft.com/office/powerpoint/2010/main" val="601203326"/>
+        <p14:creationId xmlns:p14="http://schemas.microsoft.com/office/powerpoint/2010/main" val="3954877096"/>
       </p:ext>
     </p:extLst>
   </p:cSld>
@@ -3754,7 +3704,7 @@
           <p:cNvPr id="2" name="Title 1">
             <a:extLst>
               <a:ext uri="{FF2B5EF4-FFF2-40B4-BE49-F238E27FC236}">
-                <a16:creationId xmlns:a16="http://schemas.microsoft.com/office/drawing/2014/main" id="{3FD3C42F-B963-48FE-A614-759D4D5E77F9}"/>
+                <a16:creationId xmlns:a16="http://schemas.microsoft.com/office/drawing/2014/main" id="{0913D910-9A05-4549-9611-8D7A36D0DDE9}"/>
               </a:ext>
             </a:extLst>
           </p:cNvPr>
@@ -3772,7 +3722,7 @@
           <a:p>
             <a:r>
               <a:rPr lang="en-US" dirty="0"/>
-              <a:t>MVC cont.</a:t>
+              <a:t>ASP.NET Core (Mod 0: Topic 6)</a:t>
             </a:r>
           </a:p>
         </p:txBody>
@@ -3782,7 +3732,7 @@
           <p:cNvPr id="3" name="Content Placeholder 2">
             <a:extLst>
               <a:ext uri="{FF2B5EF4-FFF2-40B4-BE49-F238E27FC236}">
-                <a16:creationId xmlns:a16="http://schemas.microsoft.com/office/drawing/2014/main" id="{0801C3CC-CF77-449B-88DB-CAA4B736478C}"/>
+                <a16:creationId xmlns:a16="http://schemas.microsoft.com/office/drawing/2014/main" id="{414D80AC-8137-41F4-AEB8-C409CE6131FA}"/>
               </a:ext>
             </a:extLst>
           </p:cNvPr>
@@ -3796,54 +3746,89 @@
         <p:spPr/>
         <p:txBody>
           <a:bodyPr>
-            <a:normAutofit/>
+            <a:normAutofit fontScale="92500" lnSpcReduction="20000"/>
           </a:bodyPr>
           <a:lstStyle/>
           <a:p>
             <a:r>
               <a:rPr lang="en-US" dirty="0"/>
-              <a:t>Benefits of MVC</a:t>
+              <a:t>2002: ASP.NET Web Forms</a:t>
             </a:r>
           </a:p>
           <a:p>
             <a:pPr lvl="1"/>
             <a:r>
               <a:rPr lang="en-US" dirty="0"/>
-              <a:t>Makes it easier to have different members of a team work on different components</a:t>
+              <a:t>Provided rapid development similar to Windows Forms</a:t>
+            </a:r>
+          </a:p>
+          <a:p>
+            <a:r>
+              <a:rPr lang="en-US" dirty="0"/>
+              <a:t>2007: ASP.NET MVC</a:t>
             </a:r>
           </a:p>
           <a:p>
             <a:pPr lvl="1"/>
             <a:r>
               <a:rPr lang="en-US" dirty="0"/>
-              <a:t>Makes it possible to automate testing of individual components</a:t>
+              <a:t>Used the MVC patters (separation of concerns, etc.)</a:t>
             </a:r>
           </a:p>
           <a:p>
             <a:pPr lvl="1"/>
             <a:r>
               <a:rPr lang="en-US" dirty="0"/>
-              <a:t>Makes it possible to swap out one component for another component</a:t>
+              <a:t>Still runs on proprietary ASP.NET Framework</a:t>
+            </a:r>
+          </a:p>
+          <a:p>
+            <a:r>
+              <a:rPr lang="en-US" dirty="0"/>
+              <a:t>2015: ASP.NET Core MVC</a:t>
             </a:r>
           </a:p>
           <a:p>
             <a:pPr lvl="1"/>
             <a:r>
               <a:rPr lang="en-US" dirty="0"/>
-              <a:t>Makes the app easier to maintain</a:t>
-            </a:r>
-          </a:p>
-          <a:p>
-            <a:r>
-              <a:rPr lang="en-US" dirty="0"/>
-              <a:t>Drawbacks of MVC</a:t>
+              <a:t>Runs on ASP.NET Core Framework (open source)</a:t>
             </a:r>
           </a:p>
           <a:p>
             <a:pPr lvl="1"/>
             <a:r>
               <a:rPr lang="en-US" dirty="0"/>
-              <a:t>Requires more work to set up</a:t>
+              <a:t>“Merged” ASP.NET MVC and ASP.NET Web </a:t>
+            </a:r>
+            <a:r>
+              <a:rPr lang="en-US" dirty="0" err="1"/>
+              <a:t>Api</a:t>
+            </a:r>
+            <a:endParaRPr lang="en-US" dirty="0"/>
+          </a:p>
+          <a:p>
+            <a:pPr lvl="1"/>
+            <a:r>
+              <a:rPr lang="en-US" dirty="0"/>
+              <a:t>V1 released 2016</a:t>
+            </a:r>
+          </a:p>
+          <a:p>
+            <a:pPr lvl="1"/>
+            <a:endParaRPr lang="en-US" dirty="0"/>
+          </a:p>
+          <a:p>
+            <a:r>
+              <a:rPr lang="en-US" dirty="0"/>
+              <a:t>.NET Framework/.NET Core/Microsoft hates numbers</a:t>
+            </a:r>
+          </a:p>
+          <a:p>
+            <a:pPr lvl="1"/>
+            <a:r>
+              <a:rPr lang="en-US" dirty="0"/>
+              <a:t>.NET Framework + .NET Core =&gt; .NET 5</a:t>
             </a:r>
           </a:p>
         </p:txBody>
@@ -3851,7 +3836,7 @@
     </p:spTree>
     <p:extLst>
       <p:ext uri="{BB962C8B-B14F-4D97-AF65-F5344CB8AC3E}">
-        <p14:creationId xmlns:p14="http://schemas.microsoft.com/office/powerpoint/2010/main" val="1551656711"/>
+        <p14:creationId xmlns:p14="http://schemas.microsoft.com/office/powerpoint/2010/main" val="2543742822"/>
       </p:ext>
     </p:extLst>
   </p:cSld>
@@ -3901,7 +3886,7 @@
           <a:p>
             <a:r>
               <a:rPr lang="en-US" dirty="0"/>
-              <a:t>MVC Demo (Mod 1: Topic 1)</a:t>
+              <a:t>Model View Controller (Mod 1: Topic 1)</a:t>
             </a:r>
           </a:p>
         </p:txBody>
@@ -3924,38 +3909,60 @@
         </p:nvSpPr>
         <p:spPr/>
         <p:txBody>
-          <a:bodyPr>
-            <a:normAutofit/>
-          </a:bodyPr>
-          <a:lstStyle/>
-          <a:p>
-            <a:r>
-              <a:rPr lang="en-US" dirty="0"/>
-              <a:t>Create an ASP.NET Core MVC Application</a:t>
-            </a:r>
-          </a:p>
-          <a:p>
-            <a:r>
-              <a:rPr lang="en-US" dirty="0"/>
-              <a:t>Delete unnecessary files (Controllers, Models, and Views folder contents)</a:t>
-            </a:r>
-          </a:p>
-          <a:p>
-            <a:r>
-              <a:rPr lang="en-US" dirty="0"/>
-              <a:t>Add a controller, view, and model</a:t>
-            </a:r>
-          </a:p>
-          <a:p>
-            <a:r>
-              <a:rPr lang="en-US" dirty="0"/>
-              <a:t>Handle GET/POST requests</a:t>
-            </a:r>
-          </a:p>
-          <a:p>
-            <a:r>
-              <a:rPr lang="en-US" dirty="0"/>
-              <a:t>Validate User Input</a:t>
+          <a:bodyPr/>
+          <a:lstStyle/>
+          <a:p>
+            <a:r>
+              <a:rPr lang="en-US" dirty="0"/>
+              <a:t>Model View Controller (MVC)</a:t>
+            </a:r>
+          </a:p>
+          <a:p>
+            <a:pPr lvl="1"/>
+            <a:r>
+              <a:rPr lang="en-US" dirty="0"/>
+              <a:t>Model: Consists of the code that provides the data access and business logic</a:t>
+            </a:r>
+          </a:p>
+          <a:p>
+            <a:pPr lvl="1"/>
+            <a:r>
+              <a:rPr lang="en-US" dirty="0"/>
+              <a:t>View: Consists of the code that generates the user interface</a:t>
+            </a:r>
+          </a:p>
+          <a:p>
+            <a:pPr lvl="1"/>
+            <a:r>
+              <a:rPr lang="en-US" dirty="0"/>
+              <a:t>Controller: Consist of the code that receives requests from users, gets the appropriate data and stores it in the model, and passes the model to the appropriate view</a:t>
+            </a:r>
+          </a:p>
+          <a:p>
+            <a:r>
+              <a:rPr lang="en-US" dirty="0"/>
+              <a:t>“Separation of duties”</a:t>
+            </a:r>
+          </a:p>
+          <a:p>
+            <a:pPr lvl="1"/>
+            <a:r>
+              <a:rPr lang="en-US" dirty="0"/>
+              <a:t>Keep your data (database, webservice, etc.) separate from how you display your data</a:t>
+            </a:r>
+          </a:p>
+          <a:p>
+            <a:pPr lvl="1"/>
+            <a:r>
+              <a:rPr lang="en-US" dirty="0"/>
+              <a:t>Easy to test</a:t>
+            </a:r>
+          </a:p>
+          <a:p>
+            <a:pPr lvl="1"/>
+            <a:r>
+              <a:rPr lang="en-US" dirty="0"/>
+              <a:t>“Easy” to change either the UI or the Database</a:t>
             </a:r>
           </a:p>
         </p:txBody>
@@ -3963,7 +3970,7 @@
     </p:spTree>
     <p:extLst>
       <p:ext uri="{BB962C8B-B14F-4D97-AF65-F5344CB8AC3E}">
-        <p14:creationId xmlns:p14="http://schemas.microsoft.com/office/powerpoint/2010/main" val="1366350466"/>
+        <p14:creationId xmlns:p14="http://schemas.microsoft.com/office/powerpoint/2010/main" val="601203326"/>
       </p:ext>
     </p:extLst>
   </p:cSld>
@@ -3995,7 +4002,7 @@
           <p:cNvPr id="2" name="Title 1">
             <a:extLst>
               <a:ext uri="{FF2B5EF4-FFF2-40B4-BE49-F238E27FC236}">
-                <a16:creationId xmlns:a16="http://schemas.microsoft.com/office/drawing/2014/main" id="{BD05DA10-2509-4FB8-8102-F8DFD44E722A}"/>
+                <a16:creationId xmlns:a16="http://schemas.microsoft.com/office/drawing/2014/main" id="{3FD3C42F-B963-48FE-A614-759D4D5E77F9}"/>
               </a:ext>
             </a:extLst>
           </p:cNvPr>
@@ -4013,7 +4020,7 @@
           <a:p>
             <a:r>
               <a:rPr lang="en-US" dirty="0"/>
-              <a:t>Responsive Web App (Mod 1: Topic 2)</a:t>
+              <a:t>MVC cont.</a:t>
             </a:r>
           </a:p>
         </p:txBody>
@@ -4023,7 +4030,7 @@
           <p:cNvPr id="3" name="Content Placeholder 2">
             <a:extLst>
               <a:ext uri="{FF2B5EF4-FFF2-40B4-BE49-F238E27FC236}">
-                <a16:creationId xmlns:a16="http://schemas.microsoft.com/office/drawing/2014/main" id="{430F3889-E86F-4F6B-8FE5-E187FBDCB400}"/>
+                <a16:creationId xmlns:a16="http://schemas.microsoft.com/office/drawing/2014/main" id="{0801C3CC-CF77-449B-88DB-CAA4B736478C}"/>
               </a:ext>
             </a:extLst>
           </p:cNvPr>
@@ -4036,79 +4043,63 @@
         </p:nvSpPr>
         <p:spPr/>
         <p:txBody>
-          <a:bodyPr/>
-          <a:lstStyle/>
-          <a:p>
-            <a:r>
-              <a:rPr lang="en-US" dirty="0"/>
-              <a:t>Chapter 3</a:t>
-            </a:r>
-          </a:p>
-          <a:p>
-            <a:r>
-              <a:rPr lang="en-US" dirty="0"/>
-              <a:t>Responsive Design</a:t>
+          <a:bodyPr>
+            <a:normAutofit/>
+          </a:bodyPr>
+          <a:lstStyle/>
+          <a:p>
+            <a:r>
+              <a:rPr lang="en-US" dirty="0"/>
+              <a:t>Benefits of MVC</a:t>
             </a:r>
           </a:p>
           <a:p>
             <a:pPr lvl="1"/>
             <a:r>
               <a:rPr lang="en-US" dirty="0"/>
-              <a:t>Design must handle multiple form factors (phone, tablet, laptop, etc.)</a:t>
+              <a:t>Makes it easier to have different members of a team work on different components</a:t>
             </a:r>
           </a:p>
           <a:p>
             <a:pPr lvl="1"/>
             <a:r>
               <a:rPr lang="en-US" dirty="0"/>
-              <a:t>Use HTML and CSS</a:t>
+              <a:t>Makes it possible to automate testing of individual components</a:t>
             </a:r>
           </a:p>
           <a:p>
             <a:pPr lvl="1"/>
             <a:r>
               <a:rPr lang="en-US" dirty="0"/>
-              <a:t>Bootstrap is an existing framework</a:t>
-            </a:r>
-          </a:p>
-          <a:p>
-            <a:r>
-              <a:rPr lang="en-US" dirty="0"/>
-              <a:t>w3schools examples: </a:t>
-            </a:r>
-            <a:r>
-              <a:rPr lang="en-US" dirty="0">
-                <a:hlinkClick r:id="rId2"/>
-              </a:rPr>
-              <a:t>https://www.w3schools.com/html/html_responsive.asp</a:t>
-            </a:r>
-            <a:endParaRPr lang="en-US" dirty="0"/>
-          </a:p>
-          <a:p>
-            <a:r>
-              <a:rPr lang="en-US" dirty="0"/>
-              <a:t>Bootstrap: </a:t>
-            </a:r>
-            <a:r>
-              <a:rPr lang="en-US" dirty="0">
-                <a:hlinkClick r:id="rId3"/>
-              </a:rPr>
-              <a:t>https://getbootstrap.com/docs/4.4/getting-started/introduction/</a:t>
-            </a:r>
-            <a:endParaRPr lang="en-US" dirty="0"/>
-          </a:p>
-          <a:p>
-            <a:endParaRPr lang="en-US" dirty="0"/>
-          </a:p>
-          <a:p>
-            <a:endParaRPr lang="en-US" dirty="0"/>
+              <a:t>Makes it possible to swap out one component for another component</a:t>
+            </a:r>
+          </a:p>
+          <a:p>
+            <a:pPr lvl="1"/>
+            <a:r>
+              <a:rPr lang="en-US" dirty="0"/>
+              <a:t>Makes the app easier to maintain</a:t>
+            </a:r>
+          </a:p>
+          <a:p>
+            <a:r>
+              <a:rPr lang="en-US" dirty="0"/>
+              <a:t>Drawbacks of MVC</a:t>
+            </a:r>
+          </a:p>
+          <a:p>
+            <a:pPr lvl="1"/>
+            <a:r>
+              <a:rPr lang="en-US" dirty="0"/>
+              <a:t>Requires more work to set up</a:t>
+            </a:r>
           </a:p>
         </p:txBody>
       </p:sp>
     </p:spTree>
     <p:extLst>
       <p:ext uri="{BB962C8B-B14F-4D97-AF65-F5344CB8AC3E}">
-        <p14:creationId xmlns:p14="http://schemas.microsoft.com/office/powerpoint/2010/main" val="399605050"/>
+        <p14:creationId xmlns:p14="http://schemas.microsoft.com/office/powerpoint/2010/main" val="1551656711"/>
       </p:ext>
     </p:extLst>
   </p:cSld>
@@ -4140,6 +4131,263 @@
           <p:cNvPr id="2" name="Title 1">
             <a:extLst>
               <a:ext uri="{FF2B5EF4-FFF2-40B4-BE49-F238E27FC236}">
+                <a16:creationId xmlns:a16="http://schemas.microsoft.com/office/drawing/2014/main" id="{3FD3C42F-B963-48FE-A614-759D4D5E77F9}"/>
+              </a:ext>
+            </a:extLst>
+          </p:cNvPr>
+          <p:cNvSpPr>
+            <a:spLocks noGrp="1"/>
+          </p:cNvSpPr>
+          <p:nvPr>
+            <p:ph type="title"/>
+          </p:nvPr>
+        </p:nvSpPr>
+        <p:spPr/>
+        <p:txBody>
+          <a:bodyPr/>
+          <a:lstStyle/>
+          <a:p>
+            <a:r>
+              <a:rPr lang="en-US" dirty="0"/>
+              <a:t>MVC Demo (Mod 1: Topic 1)</a:t>
+            </a:r>
+          </a:p>
+        </p:txBody>
+      </p:sp>
+      <p:sp>
+        <p:nvSpPr>
+          <p:cNvPr id="3" name="Content Placeholder 2">
+            <a:extLst>
+              <a:ext uri="{FF2B5EF4-FFF2-40B4-BE49-F238E27FC236}">
+                <a16:creationId xmlns:a16="http://schemas.microsoft.com/office/drawing/2014/main" id="{0801C3CC-CF77-449B-88DB-CAA4B736478C}"/>
+              </a:ext>
+            </a:extLst>
+          </p:cNvPr>
+          <p:cNvSpPr>
+            <a:spLocks noGrp="1"/>
+          </p:cNvSpPr>
+          <p:nvPr>
+            <p:ph idx="1"/>
+          </p:nvPr>
+        </p:nvSpPr>
+        <p:spPr/>
+        <p:txBody>
+          <a:bodyPr>
+            <a:normAutofit/>
+          </a:bodyPr>
+          <a:lstStyle/>
+          <a:p>
+            <a:r>
+              <a:rPr lang="en-US" dirty="0"/>
+              <a:t>Create an ASP.NET Core MVC Application</a:t>
+            </a:r>
+          </a:p>
+          <a:p>
+            <a:r>
+              <a:rPr lang="en-US" dirty="0"/>
+              <a:t>Delete unnecessary files (Controllers, Models, and Views folder contents)</a:t>
+            </a:r>
+          </a:p>
+          <a:p>
+            <a:r>
+              <a:rPr lang="en-US" dirty="0"/>
+              <a:t>Add a controller, view, and model</a:t>
+            </a:r>
+          </a:p>
+          <a:p>
+            <a:r>
+              <a:rPr lang="en-US" dirty="0"/>
+              <a:t>Handle GET/POST requests</a:t>
+            </a:r>
+          </a:p>
+          <a:p>
+            <a:r>
+              <a:rPr lang="en-US" dirty="0"/>
+              <a:t>Validate User Input</a:t>
+            </a:r>
+          </a:p>
+        </p:txBody>
+      </p:sp>
+    </p:spTree>
+    <p:extLst>
+      <p:ext uri="{BB962C8B-B14F-4D97-AF65-F5344CB8AC3E}">
+        <p14:creationId xmlns:p14="http://schemas.microsoft.com/office/powerpoint/2010/main" val="1366350466"/>
+      </p:ext>
+    </p:extLst>
+  </p:cSld>
+  <p:clrMapOvr>
+    <a:masterClrMapping/>
+  </p:clrMapOvr>
+</p:sld>
+</file>
+
+<file path=ppt/slides/slide16.xml><?xml version="1.0" encoding="utf-8"?>
+<p:sld xmlns:a="http://schemas.openxmlformats.org/drawingml/2006/main" xmlns:r="http://schemas.openxmlformats.org/officeDocument/2006/relationships" xmlns:p="http://schemas.openxmlformats.org/presentationml/2006/main">
+  <p:cSld>
+    <p:spTree>
+      <p:nvGrpSpPr>
+        <p:cNvPr id="1" name=""/>
+        <p:cNvGrpSpPr/>
+        <p:nvPr/>
+      </p:nvGrpSpPr>
+      <p:grpSpPr>
+        <a:xfrm>
+          <a:off x="0" y="0"/>
+          <a:ext cx="0" cy="0"/>
+          <a:chOff x="0" y="0"/>
+          <a:chExt cx="0" cy="0"/>
+        </a:xfrm>
+      </p:grpSpPr>
+      <p:sp>
+        <p:nvSpPr>
+          <p:cNvPr id="2" name="Title 1">
+            <a:extLst>
+              <a:ext uri="{FF2B5EF4-FFF2-40B4-BE49-F238E27FC236}">
+                <a16:creationId xmlns:a16="http://schemas.microsoft.com/office/drawing/2014/main" id="{BD05DA10-2509-4FB8-8102-F8DFD44E722A}"/>
+              </a:ext>
+            </a:extLst>
+          </p:cNvPr>
+          <p:cNvSpPr>
+            <a:spLocks noGrp="1"/>
+          </p:cNvSpPr>
+          <p:nvPr>
+            <p:ph type="title"/>
+          </p:nvPr>
+        </p:nvSpPr>
+        <p:spPr/>
+        <p:txBody>
+          <a:bodyPr/>
+          <a:lstStyle/>
+          <a:p>
+            <a:r>
+              <a:rPr lang="en-US" dirty="0"/>
+              <a:t>Responsive Web App (Mod 1: Topic 2)</a:t>
+            </a:r>
+          </a:p>
+        </p:txBody>
+      </p:sp>
+      <p:sp>
+        <p:nvSpPr>
+          <p:cNvPr id="3" name="Content Placeholder 2">
+            <a:extLst>
+              <a:ext uri="{FF2B5EF4-FFF2-40B4-BE49-F238E27FC236}">
+                <a16:creationId xmlns:a16="http://schemas.microsoft.com/office/drawing/2014/main" id="{430F3889-E86F-4F6B-8FE5-E187FBDCB400}"/>
+              </a:ext>
+            </a:extLst>
+          </p:cNvPr>
+          <p:cNvSpPr>
+            <a:spLocks noGrp="1"/>
+          </p:cNvSpPr>
+          <p:nvPr>
+            <p:ph idx="1"/>
+          </p:nvPr>
+        </p:nvSpPr>
+        <p:spPr/>
+        <p:txBody>
+          <a:bodyPr/>
+          <a:lstStyle/>
+          <a:p>
+            <a:r>
+              <a:rPr lang="en-US" dirty="0"/>
+              <a:t>Chapter 3</a:t>
+            </a:r>
+          </a:p>
+          <a:p>
+            <a:r>
+              <a:rPr lang="en-US" dirty="0"/>
+              <a:t>Responsive Design</a:t>
+            </a:r>
+          </a:p>
+          <a:p>
+            <a:pPr lvl="1"/>
+            <a:r>
+              <a:rPr lang="en-US" dirty="0"/>
+              <a:t>Design must handle multiple form factors (phone, tablet, laptop, etc.)</a:t>
+            </a:r>
+          </a:p>
+          <a:p>
+            <a:pPr lvl="1"/>
+            <a:r>
+              <a:rPr lang="en-US" dirty="0"/>
+              <a:t>Use HTML and CSS</a:t>
+            </a:r>
+          </a:p>
+          <a:p>
+            <a:pPr lvl="1"/>
+            <a:r>
+              <a:rPr lang="en-US" dirty="0"/>
+              <a:t>Bootstrap is an existing framework</a:t>
+            </a:r>
+          </a:p>
+          <a:p>
+            <a:r>
+              <a:rPr lang="en-US" dirty="0"/>
+              <a:t>w3schools examples: </a:t>
+            </a:r>
+            <a:r>
+              <a:rPr lang="en-US" dirty="0">
+                <a:hlinkClick r:id="rId2"/>
+              </a:rPr>
+              <a:t>https://www.w3schools.com/html/html_responsive.asp</a:t>
+            </a:r>
+            <a:endParaRPr lang="en-US" dirty="0"/>
+          </a:p>
+          <a:p>
+            <a:r>
+              <a:rPr lang="en-US" dirty="0"/>
+              <a:t>Bootstrap: </a:t>
+            </a:r>
+            <a:r>
+              <a:rPr lang="en-US" dirty="0">
+                <a:hlinkClick r:id="rId3"/>
+              </a:rPr>
+              <a:t>https://getbootstrap.com/docs/4.4/getting-started/introduction/</a:t>
+            </a:r>
+            <a:endParaRPr lang="en-US" dirty="0"/>
+          </a:p>
+          <a:p>
+            <a:endParaRPr lang="en-US" dirty="0"/>
+          </a:p>
+          <a:p>
+            <a:endParaRPr lang="en-US" dirty="0"/>
+          </a:p>
+        </p:txBody>
+      </p:sp>
+    </p:spTree>
+    <p:extLst>
+      <p:ext uri="{BB962C8B-B14F-4D97-AF65-F5344CB8AC3E}">
+        <p14:creationId xmlns:p14="http://schemas.microsoft.com/office/powerpoint/2010/main" val="399605050"/>
+      </p:ext>
+    </p:extLst>
+  </p:cSld>
+  <p:clrMapOvr>
+    <a:masterClrMapping/>
+  </p:clrMapOvr>
+</p:sld>
+</file>
+
+<file path=ppt/slides/slide17.xml><?xml version="1.0" encoding="utf-8"?>
+<p:sld xmlns:a="http://schemas.openxmlformats.org/drawingml/2006/main" xmlns:r="http://schemas.openxmlformats.org/officeDocument/2006/relationships" xmlns:p="http://schemas.openxmlformats.org/presentationml/2006/main">
+  <p:cSld>
+    <p:spTree>
+      <p:nvGrpSpPr>
+        <p:cNvPr id="1" name=""/>
+        <p:cNvGrpSpPr/>
+        <p:nvPr/>
+      </p:nvGrpSpPr>
+      <p:grpSpPr>
+        <a:xfrm>
+          <a:off x="0" y="0"/>
+          <a:ext cx="0" cy="0"/>
+          <a:chOff x="0" y="0"/>
+          <a:chExt cx="0" cy="0"/>
+        </a:xfrm>
+      </p:grpSpPr>
+      <p:sp>
+        <p:nvSpPr>
+          <p:cNvPr id="2" name="Title 1">
+            <a:extLst>
+              <a:ext uri="{FF2B5EF4-FFF2-40B4-BE49-F238E27FC236}">
                 <a16:creationId xmlns:a16="http://schemas.microsoft.com/office/drawing/2014/main" id="{63432955-1FDA-4499-A6D0-7E2C8955FD1D}"/>
               </a:ext>
             </a:extLst>
@@ -4229,7 +4477,7 @@
 </p:sld>
 </file>
 
-<file path=ppt/slides/slide16.xml><?xml version="1.0" encoding="utf-8"?>
+<file path=ppt/slides/slide18.xml><?xml version="1.0" encoding="utf-8"?>
 <p:sld xmlns:a="http://schemas.openxmlformats.org/drawingml/2006/main" xmlns:r="http://schemas.openxmlformats.org/officeDocument/2006/relationships" xmlns:p="http://schemas.openxmlformats.org/presentationml/2006/main">
   <p:cSld>
     <p:spTree>
@@ -4766,7 +5014,7 @@
           <p:cNvPr id="2" name="Title 1">
             <a:extLst>
               <a:ext uri="{FF2B5EF4-FFF2-40B4-BE49-F238E27FC236}">
-                <a16:creationId xmlns:a16="http://schemas.microsoft.com/office/drawing/2014/main" id="{30F02C47-3486-4C07-8B5C-2DE4BC9817E7}"/>
+                <a16:creationId xmlns:a16="http://schemas.microsoft.com/office/drawing/2014/main" id="{39A5572F-ED20-41CA-BD5D-2D4EA6B6C835}"/>
               </a:ext>
             </a:extLst>
           </p:cNvPr>
@@ -4784,7 +5032,7 @@
           <a:p>
             <a:r>
               <a:rPr lang="en-US" dirty="0"/>
-              <a:t>Assignments (Module 1)</a:t>
+              <a:t>Topics (Module 0)</a:t>
             </a:r>
           </a:p>
         </p:txBody>
@@ -4794,7 +5042,7 @@
           <p:cNvPr id="3" name="Content Placeholder 2">
             <a:extLst>
               <a:ext uri="{FF2B5EF4-FFF2-40B4-BE49-F238E27FC236}">
-                <a16:creationId xmlns:a16="http://schemas.microsoft.com/office/drawing/2014/main" id="{370E5A68-7A41-45DD-9F75-8EF45C60C8E7}"/>
+                <a16:creationId xmlns:a16="http://schemas.microsoft.com/office/drawing/2014/main" id="{195F3100-37B3-4FCD-B920-41EA836EAF64}"/>
               </a:ext>
             </a:extLst>
           </p:cNvPr>
@@ -4812,31 +5060,37 @@
           <a:p>
             <a:r>
               <a:rPr lang="en-US" dirty="0"/>
-              <a:t>Murach Chapter 2 Quiz (Topic 1)</a:t>
-            </a:r>
-          </a:p>
-          <a:p>
-            <a:r>
-              <a:rPr lang="en-US" dirty="0"/>
-              <a:t>Lab MVC App (Topic 1)</a:t>
-            </a:r>
-          </a:p>
-          <a:p>
-            <a:r>
-              <a:rPr lang="en-US" dirty="0"/>
-              <a:t>Murach Chapter 3 Quiz (Topic 2)</a:t>
-            </a:r>
-          </a:p>
-          <a:p>
-            <a:r>
-              <a:rPr lang="en-US" dirty="0"/>
-              <a:t>Responsive Web App (Topic 2)</a:t>
-            </a:r>
-          </a:p>
-          <a:p>
-            <a:r>
-              <a:rPr lang="en-US" dirty="0"/>
-              <a:t>Final Project Introduction (Topic 3)</a:t>
+              <a:t>Getting started with Blackboard</a:t>
+            </a:r>
+          </a:p>
+          <a:p>
+            <a:r>
+              <a:rPr lang="en-US" dirty="0"/>
+              <a:t>Class Introductions</a:t>
+            </a:r>
+          </a:p>
+          <a:p>
+            <a:r>
+              <a:rPr lang="en-US" dirty="0"/>
+              <a:t>Text and Course Resources</a:t>
+            </a:r>
+          </a:p>
+          <a:p>
+            <a:r>
+              <a:rPr lang="en-US" dirty="0"/>
+              <a:t>Software used in the course</a:t>
+            </a:r>
+          </a:p>
+          <a:p>
+            <a:r>
+              <a:rPr lang="en-US" dirty="0"/>
+              <a:t>First Application</a:t>
+            </a:r>
+          </a:p>
+          <a:p>
+            <a:r>
+              <a:rPr lang="en-US" dirty="0"/>
+              <a:t>Getting Started</a:t>
             </a:r>
           </a:p>
         </p:txBody>
@@ -4844,7 +5098,7 @@
     </p:spTree>
     <p:extLst>
       <p:ext uri="{BB962C8B-B14F-4D97-AF65-F5344CB8AC3E}">
-        <p14:creationId xmlns:p14="http://schemas.microsoft.com/office/powerpoint/2010/main" val="1288585140"/>
+        <p14:creationId xmlns:p14="http://schemas.microsoft.com/office/powerpoint/2010/main" val="27561486"/>
       </p:ext>
     </p:extLst>
   </p:cSld>
@@ -4876,7 +5130,7 @@
           <p:cNvPr id="2" name="Title 1">
             <a:extLst>
               <a:ext uri="{FF2B5EF4-FFF2-40B4-BE49-F238E27FC236}">
-                <a16:creationId xmlns:a16="http://schemas.microsoft.com/office/drawing/2014/main" id="{A598EE5E-400C-4423-9F57-6FA11E70B898}"/>
+                <a16:creationId xmlns:a16="http://schemas.microsoft.com/office/drawing/2014/main" id="{30F02C47-3486-4C07-8B5C-2DE4BC9817E7}"/>
               </a:ext>
             </a:extLst>
           </p:cNvPr>
@@ -4894,7 +5148,7 @@
           <a:p>
             <a:r>
               <a:rPr lang="en-US" dirty="0"/>
-              <a:t>Topics</a:t>
+              <a:t>Assignments (Module 1)</a:t>
             </a:r>
           </a:p>
         </p:txBody>
@@ -4904,7 +5158,7 @@
           <p:cNvPr id="3" name="Content Placeholder 2">
             <a:extLst>
               <a:ext uri="{FF2B5EF4-FFF2-40B4-BE49-F238E27FC236}">
-                <a16:creationId xmlns:a16="http://schemas.microsoft.com/office/drawing/2014/main" id="{88125CA4-AF98-40E1-BC80-A98814E550E5}"/>
+                <a16:creationId xmlns:a16="http://schemas.microsoft.com/office/drawing/2014/main" id="{370E5A68-7A41-45DD-9F75-8EF45C60C8E7}"/>
               </a:ext>
             </a:extLst>
           </p:cNvPr>
@@ -4922,49 +5176,31 @@
           <a:p>
             <a:r>
               <a:rPr lang="en-US" dirty="0"/>
-              <a:t>Blackboard Overview</a:t>
-            </a:r>
-          </a:p>
-          <a:p>
-            <a:r>
-              <a:rPr lang="en-US" dirty="0"/>
-              <a:t>Class Introductions</a:t>
-            </a:r>
-          </a:p>
-          <a:p>
-            <a:r>
-              <a:rPr lang="en-US" dirty="0"/>
-              <a:t>Software Installs</a:t>
-            </a:r>
-          </a:p>
-          <a:p>
-            <a:r>
-              <a:rPr lang="en-US" dirty="0"/>
-              <a:t>Hello World MVC Web App</a:t>
-            </a:r>
-          </a:p>
-          <a:p>
-            <a:r>
-              <a:rPr lang="en-US" dirty="0"/>
-              <a:t>Getting Started with ASP.NET Core</a:t>
-            </a:r>
-          </a:p>
-          <a:p>
-            <a:r>
-              <a:rPr lang="en-US" dirty="0"/>
-              <a:t>Model View Controller (MVC) Overview</a:t>
-            </a:r>
-          </a:p>
-          <a:p>
-            <a:r>
-              <a:rPr lang="en-US" dirty="0"/>
-              <a:t>Responsive Web App</a:t>
-            </a:r>
-          </a:p>
-          <a:p>
-            <a:r>
-              <a:rPr lang="en-US" dirty="0"/>
-              <a:t>Brainstorm Final Project Ideas</a:t>
+              <a:t>Murach Chapter 2 Quiz (Topic 1)</a:t>
+            </a:r>
+          </a:p>
+          <a:p>
+            <a:r>
+              <a:rPr lang="en-US" dirty="0"/>
+              <a:t>Lab MVC App (Topic 1)</a:t>
+            </a:r>
+          </a:p>
+          <a:p>
+            <a:r>
+              <a:rPr lang="en-US" dirty="0"/>
+              <a:t>Murach Chapter 3 Quiz (Topic 2)</a:t>
+            </a:r>
+          </a:p>
+          <a:p>
+            <a:r>
+              <a:rPr lang="en-US" dirty="0"/>
+              <a:t>Responsive Web App (Topic 2)</a:t>
+            </a:r>
+          </a:p>
+          <a:p>
+            <a:r>
+              <a:rPr lang="en-US" dirty="0"/>
+              <a:t>Final Project Introduction (Topic 3)</a:t>
             </a:r>
           </a:p>
         </p:txBody>
@@ -4972,7 +5208,7 @@
     </p:spTree>
     <p:extLst>
       <p:ext uri="{BB962C8B-B14F-4D97-AF65-F5344CB8AC3E}">
-        <p14:creationId xmlns:p14="http://schemas.microsoft.com/office/powerpoint/2010/main" val="1397827322"/>
+        <p14:creationId xmlns:p14="http://schemas.microsoft.com/office/powerpoint/2010/main" val="1288585140"/>
       </p:ext>
     </p:extLst>
   </p:cSld>
@@ -5004,7 +5240,7 @@
           <p:cNvPr id="2" name="Title 1">
             <a:extLst>
               <a:ext uri="{FF2B5EF4-FFF2-40B4-BE49-F238E27FC236}">
-                <a16:creationId xmlns:a16="http://schemas.microsoft.com/office/drawing/2014/main" id="{3BDD5486-A245-4AAE-A2A0-A85ED0F57AB0}"/>
+                <a16:creationId xmlns:a16="http://schemas.microsoft.com/office/drawing/2014/main" id="{30F02C47-3486-4C07-8B5C-2DE4BC9817E7}"/>
               </a:ext>
             </a:extLst>
           </p:cNvPr>
@@ -5022,7 +5258,7 @@
           <a:p>
             <a:r>
               <a:rPr lang="en-US" dirty="0"/>
-              <a:t>Blackboard Overview</a:t>
+              <a:t>Assignments (Module 1)</a:t>
             </a:r>
           </a:p>
         </p:txBody>
@@ -5032,7 +5268,7 @@
           <p:cNvPr id="3" name="Content Placeholder 2">
             <a:extLst>
               <a:ext uri="{FF2B5EF4-FFF2-40B4-BE49-F238E27FC236}">
-                <a16:creationId xmlns:a16="http://schemas.microsoft.com/office/drawing/2014/main" id="{676DDF1E-7949-4AF8-9F3E-CEEE7BA076CB}"/>
+                <a16:creationId xmlns:a16="http://schemas.microsoft.com/office/drawing/2014/main" id="{370E5A68-7A41-45DD-9F75-8EF45C60C8E7}"/>
               </a:ext>
             </a:extLst>
           </p:cNvPr>
@@ -5050,60 +5286,19 @@
           <a:p>
             <a:r>
               <a:rPr lang="en-US" dirty="0"/>
-              <a:t>Announcements</a:t>
-            </a:r>
-          </a:p>
-          <a:p>
-            <a:r>
-              <a:rPr lang="en-US" dirty="0"/>
-              <a:t>Syllabus</a:t>
-            </a:r>
-          </a:p>
-          <a:p>
-            <a:pPr lvl="1"/>
-            <a:r>
-              <a:rPr lang="en-US" dirty="0"/>
-              <a:t>2022SUM_CIS174_Syllabus: Assignments at the bottom</a:t>
-            </a:r>
-          </a:p>
-          <a:p>
-            <a:pPr lvl="1"/>
-            <a:r>
-              <a:rPr lang="en-US" dirty="0"/>
-              <a:t>Course Schedule lists all of the topics</a:t>
-            </a:r>
-          </a:p>
-          <a:p>
-            <a:r>
-              <a:rPr lang="en-US" dirty="0"/>
-              <a:t>Your Instructor</a:t>
-            </a:r>
-          </a:p>
-          <a:p>
-            <a:r>
-              <a:rPr lang="en-US" dirty="0"/>
-              <a:t>Course Content</a:t>
-            </a:r>
-          </a:p>
-          <a:p>
-            <a:pPr lvl="1"/>
-            <a:r>
-              <a:rPr lang="en-US" dirty="0"/>
-              <a:t>Weekly Class Meeting: You are here now!</a:t>
-            </a:r>
-          </a:p>
-          <a:p>
-            <a:pPr lvl="1"/>
-            <a:r>
-              <a:rPr lang="en-US" dirty="0"/>
-              <a:t>Module #: [Start Date]-[End Date]</a:t>
-            </a:r>
-          </a:p>
-          <a:p>
-            <a:pPr lvl="1"/>
-            <a:r>
-              <a:rPr lang="en-US" dirty="0"/>
-              <a:t>Course Discussion Board</a:t>
+              <a:t>MVC</a:t>
+            </a:r>
+          </a:p>
+          <a:p>
+            <a:r>
+              <a:rPr lang="en-US" dirty="0"/>
+              <a:t>Responsive Web App</a:t>
+            </a:r>
+          </a:p>
+          <a:p>
+            <a:r>
+              <a:rPr lang="en-US" dirty="0"/>
+              <a:t>Final Project</a:t>
             </a:r>
           </a:p>
         </p:txBody>
@@ -5111,7 +5306,7 @@
     </p:spTree>
     <p:extLst>
       <p:ext uri="{BB962C8B-B14F-4D97-AF65-F5344CB8AC3E}">
-        <p14:creationId xmlns:p14="http://schemas.microsoft.com/office/powerpoint/2010/main" val="1386859503"/>
+        <p14:creationId xmlns:p14="http://schemas.microsoft.com/office/powerpoint/2010/main" val="2875997191"/>
       </p:ext>
     </p:extLst>
   </p:cSld>
@@ -5143,7 +5338,7 @@
           <p:cNvPr id="2" name="Title 1">
             <a:extLst>
               <a:ext uri="{FF2B5EF4-FFF2-40B4-BE49-F238E27FC236}">
-                <a16:creationId xmlns:a16="http://schemas.microsoft.com/office/drawing/2014/main" id="{09919135-6EC5-4540-AD6D-208AA4165F38}"/>
+                <a16:creationId xmlns:a16="http://schemas.microsoft.com/office/drawing/2014/main" id="{A598EE5E-400C-4423-9F57-6FA11E70B898}"/>
               </a:ext>
             </a:extLst>
           </p:cNvPr>
@@ -5161,7 +5356,7 @@
           <a:p>
             <a:r>
               <a:rPr lang="en-US" dirty="0"/>
-              <a:t>Class Introduction (Mod 0: Topic 2)</a:t>
+              <a:t>Topics</a:t>
             </a:r>
           </a:p>
         </p:txBody>
@@ -5171,7 +5366,7 @@
           <p:cNvPr id="3" name="Content Placeholder 2">
             <a:extLst>
               <a:ext uri="{FF2B5EF4-FFF2-40B4-BE49-F238E27FC236}">
-                <a16:creationId xmlns:a16="http://schemas.microsoft.com/office/drawing/2014/main" id="{9B58BBC9-36DC-48BF-B60B-CCE74A6A0647}"/>
+                <a16:creationId xmlns:a16="http://schemas.microsoft.com/office/drawing/2014/main" id="{88125CA4-AF98-40E1-BC80-A98814E550E5}"/>
               </a:ext>
             </a:extLst>
           </p:cNvPr>
@@ -5189,73 +5384,57 @@
           <a:p>
             <a:r>
               <a:rPr lang="en-US" dirty="0"/>
-              <a:t>Create a new thread in the discussion board in the base folder of Module 0</a:t>
-            </a:r>
-          </a:p>
-          <a:p>
-            <a:pPr lvl="1"/>
-            <a:r>
-              <a:rPr lang="en-US" dirty="0"/>
-              <a:t>Subject should be your name</a:t>
-            </a:r>
-          </a:p>
-          <a:p>
-            <a:pPr lvl="1"/>
-            <a:r>
-              <a:rPr lang="en-US" dirty="0"/>
-              <a:t>Content MUST include that you have reviewed and understand the course syllabus and that you have access to your DMACC email account</a:t>
-            </a:r>
-          </a:p>
-          <a:p>
-            <a:pPr lvl="1"/>
-            <a:r>
-              <a:rPr lang="en-US" dirty="0"/>
-              <a:t>Content can include (all optional):</a:t>
-            </a:r>
-          </a:p>
-          <a:p>
-            <a:pPr lvl="2"/>
-            <a:r>
-              <a:rPr lang="en-US" dirty="0"/>
-              <a:t>Preferred Name</a:t>
-            </a:r>
-          </a:p>
-          <a:p>
-            <a:pPr lvl="2"/>
-            <a:r>
-              <a:rPr lang="en-US" dirty="0"/>
-              <a:t>Photo</a:t>
-            </a:r>
-          </a:p>
-          <a:p>
-            <a:pPr lvl="2"/>
-            <a:r>
-              <a:rPr lang="en-US" dirty="0"/>
-              <a:t>Why you took this course and what you hope to get out of it</a:t>
-            </a:r>
-          </a:p>
-          <a:p>
-            <a:pPr lvl="2"/>
-            <a:r>
-              <a:rPr lang="en-US" dirty="0"/>
-              <a:t>The area which you are most interested</a:t>
-            </a:r>
-          </a:p>
-          <a:p>
-            <a:r>
-              <a:rPr lang="en-US" dirty="0"/>
-              <a:t>Reply to at least 2 other’s posts welcoming them.</a:t>
-            </a:r>
-          </a:p>
-          <a:p>
-            <a:endParaRPr lang="en-US" dirty="0"/>
+              <a:t>Blackboard Overview</a:t>
+            </a:r>
+          </a:p>
+          <a:p>
+            <a:r>
+              <a:rPr lang="en-US" dirty="0"/>
+              <a:t>Class Introductions</a:t>
+            </a:r>
+          </a:p>
+          <a:p>
+            <a:r>
+              <a:rPr lang="en-US" dirty="0"/>
+              <a:t>Software Installs</a:t>
+            </a:r>
+          </a:p>
+          <a:p>
+            <a:r>
+              <a:rPr lang="en-US" dirty="0"/>
+              <a:t>Hello World MVC Web App</a:t>
+            </a:r>
+          </a:p>
+          <a:p>
+            <a:r>
+              <a:rPr lang="en-US" dirty="0"/>
+              <a:t>Getting Started with ASP.NET Core</a:t>
+            </a:r>
+          </a:p>
+          <a:p>
+            <a:r>
+              <a:rPr lang="en-US" dirty="0"/>
+              <a:t>Model View Controller (MVC) Overview</a:t>
+            </a:r>
+          </a:p>
+          <a:p>
+            <a:r>
+              <a:rPr lang="en-US" dirty="0"/>
+              <a:t>Responsive Web App</a:t>
+            </a:r>
+          </a:p>
+          <a:p>
+            <a:r>
+              <a:rPr lang="en-US" dirty="0"/>
+              <a:t>Brainstorm Final Project Ideas</a:t>
+            </a:r>
           </a:p>
         </p:txBody>
       </p:sp>
     </p:spTree>
     <p:extLst>
       <p:ext uri="{BB962C8B-B14F-4D97-AF65-F5344CB8AC3E}">
-        <p14:creationId xmlns:p14="http://schemas.microsoft.com/office/powerpoint/2010/main" val="3723510670"/>
+        <p14:creationId xmlns:p14="http://schemas.microsoft.com/office/powerpoint/2010/main" val="1397827322"/>
       </p:ext>
     </p:extLst>
   </p:cSld>
@@ -5287,7 +5466,7 @@
           <p:cNvPr id="2" name="Title 1">
             <a:extLst>
               <a:ext uri="{FF2B5EF4-FFF2-40B4-BE49-F238E27FC236}">
-                <a16:creationId xmlns:a16="http://schemas.microsoft.com/office/drawing/2014/main" id="{B196A59B-5282-4A6B-9665-B698AF5B8C11}"/>
+                <a16:creationId xmlns:a16="http://schemas.microsoft.com/office/drawing/2014/main" id="{3BDD5486-A245-4AAE-A2A0-A85ED0F57AB0}"/>
               </a:ext>
             </a:extLst>
           </p:cNvPr>
@@ -5305,7 +5484,7 @@
           <a:p>
             <a:r>
               <a:rPr lang="en-US" dirty="0"/>
-              <a:t>Software (Mod 0 Topic 4)</a:t>
+              <a:t>Blackboard Overview</a:t>
             </a:r>
           </a:p>
         </p:txBody>
@@ -5315,7 +5494,7 @@
           <p:cNvPr id="3" name="Content Placeholder 2">
             <a:extLst>
               <a:ext uri="{FF2B5EF4-FFF2-40B4-BE49-F238E27FC236}">
-                <a16:creationId xmlns:a16="http://schemas.microsoft.com/office/drawing/2014/main" id="{FDBD4078-CACF-41A7-9919-EE36CBA17F5C}"/>
+                <a16:creationId xmlns:a16="http://schemas.microsoft.com/office/drawing/2014/main" id="{676DDF1E-7949-4AF8-9F3E-CEEE7BA076CB}"/>
               </a:ext>
             </a:extLst>
           </p:cNvPr>
@@ -5333,40 +5512,60 @@
           <a:p>
             <a:r>
               <a:rPr lang="en-US" dirty="0"/>
-              <a:t>Visual Studio 2019 (or 2022)</a:t>
+              <a:t>Announcements</a:t>
+            </a:r>
+          </a:p>
+          <a:p>
+            <a:r>
+              <a:rPr lang="en-US" dirty="0"/>
+              <a:t>Syllabus</a:t>
             </a:r>
           </a:p>
           <a:p>
             <a:pPr lvl="1"/>
             <a:r>
               <a:rPr lang="en-US" dirty="0"/>
-              <a:t>Community is free</a:t>
-            </a:r>
-          </a:p>
-          <a:p>
-            <a:r>
-              <a:rPr lang="en-US" dirty="0"/>
-              <a:t>GitHub</a:t>
+              <a:t>2022SUM_CIS174_Syllabus: Assignments at the bottom</a:t>
             </a:r>
           </a:p>
           <a:p>
             <a:pPr lvl="1"/>
             <a:r>
               <a:rPr lang="en-US" dirty="0"/>
-              <a:t>Needs to be public</a:t>
-            </a:r>
-          </a:p>
-          <a:p>
-            <a:r>
-              <a:rPr lang="en-US" dirty="0"/>
-              <a:t>MS SQL Express</a:t>
+              <a:t>Course Schedule lists all of the topics</a:t>
+            </a:r>
+          </a:p>
+          <a:p>
+            <a:r>
+              <a:rPr lang="en-US" dirty="0"/>
+              <a:t>Your Instructor</a:t>
+            </a:r>
+          </a:p>
+          <a:p>
+            <a:r>
+              <a:rPr lang="en-US" dirty="0"/>
+              <a:t>Course Content</a:t>
             </a:r>
           </a:p>
           <a:p>
             <a:pPr lvl="1"/>
             <a:r>
               <a:rPr lang="en-US" dirty="0"/>
-              <a:t>Developer Edition is free</a:t>
+              <a:t>Weekly Class Meeting: You are here now!</a:t>
+            </a:r>
+          </a:p>
+          <a:p>
+            <a:pPr lvl="1"/>
+            <a:r>
+              <a:rPr lang="en-US" dirty="0"/>
+              <a:t>Module #: [Start Date]-[End Date]</a:t>
+            </a:r>
+          </a:p>
+          <a:p>
+            <a:pPr lvl="1"/>
+            <a:r>
+              <a:rPr lang="en-US" dirty="0"/>
+              <a:t>Course Discussion Board</a:t>
             </a:r>
           </a:p>
         </p:txBody>
@@ -5374,7 +5573,7 @@
     </p:spTree>
     <p:extLst>
       <p:ext uri="{BB962C8B-B14F-4D97-AF65-F5344CB8AC3E}">
-        <p14:creationId xmlns:p14="http://schemas.microsoft.com/office/powerpoint/2010/main" val="2039993251"/>
+        <p14:creationId xmlns:p14="http://schemas.microsoft.com/office/powerpoint/2010/main" val="1386859503"/>
       </p:ext>
     </p:extLst>
   </p:cSld>
@@ -5406,7 +5605,7 @@
           <p:cNvPr id="2" name="Title 1">
             <a:extLst>
               <a:ext uri="{FF2B5EF4-FFF2-40B4-BE49-F238E27FC236}">
-                <a16:creationId xmlns:a16="http://schemas.microsoft.com/office/drawing/2014/main" id="{84792096-D960-4A7A-997B-172F0E73A3F0}"/>
+                <a16:creationId xmlns:a16="http://schemas.microsoft.com/office/drawing/2014/main" id="{09919135-6EC5-4540-AD6D-208AA4165F38}"/>
               </a:ext>
             </a:extLst>
           </p:cNvPr>
@@ -5424,7 +5623,7 @@
           <a:p>
             <a:r>
               <a:rPr lang="en-US" dirty="0"/>
-              <a:t>First ASP.NET Core Application (Topic 5)</a:t>
+              <a:t>Class Introduction (Mod 0: Topic 2)</a:t>
             </a:r>
           </a:p>
         </p:txBody>
@@ -5434,7 +5633,7 @@
           <p:cNvPr id="3" name="Content Placeholder 2">
             <a:extLst>
               <a:ext uri="{FF2B5EF4-FFF2-40B4-BE49-F238E27FC236}">
-                <a16:creationId xmlns:a16="http://schemas.microsoft.com/office/drawing/2014/main" id="{C4430072-25B9-4686-BC36-4F9624C77AC7}"/>
+                <a16:creationId xmlns:a16="http://schemas.microsoft.com/office/drawing/2014/main" id="{9B58BBC9-36DC-48BF-B60B-CCE74A6A0647}"/>
               </a:ext>
             </a:extLst>
           </p:cNvPr>
@@ -5452,56 +5651,73 @@
           <a:p>
             <a:r>
               <a:rPr lang="en-US" dirty="0"/>
-              <a:t>Visual Studio: Getting Started</a:t>
+              <a:t>Create a new thread in the discussion board in the base folder of Module 0</a:t>
             </a:r>
           </a:p>
           <a:p>
             <a:pPr lvl="1"/>
             <a:r>
               <a:rPr lang="en-US" dirty="0"/>
-              <a:t>Create a new project</a:t>
+              <a:t>Subject should be your name</a:t>
             </a:r>
           </a:p>
           <a:p>
             <a:pPr lvl="1"/>
             <a:r>
               <a:rPr lang="en-US" dirty="0"/>
-              <a:t>ASP.NET Core Web Application</a:t>
-            </a:r>
-          </a:p>
-          <a:p>
-            <a:r>
-              <a:rPr lang="en-US" dirty="0"/>
-              <a:t>Model/View/Controller</a:t>
+              <a:t>Content MUST include that you have reviewed and understand the course syllabus and that you have access to your DMACC email account</a:t>
             </a:r>
           </a:p>
           <a:p>
             <a:pPr lvl="1"/>
             <a:r>
               <a:rPr lang="en-US" dirty="0"/>
-              <a:t>Model: Consists of the code that provides the data access and business logic</a:t>
-            </a:r>
-          </a:p>
-          <a:p>
-            <a:pPr lvl="1"/>
-            <a:r>
-              <a:rPr lang="en-US" dirty="0"/>
-              <a:t>View: Consists of the code that generates the user interface</a:t>
-            </a:r>
-          </a:p>
-          <a:p>
-            <a:pPr lvl="1"/>
-            <a:r>
-              <a:rPr lang="en-US" dirty="0"/>
-              <a:t>Controller: Consist of the code that receives requests from users, gets the appropriate data and stores it in the model, and passes the model to the appropriate view</a:t>
-            </a:r>
+              <a:t>Content can include (all optional):</a:t>
+            </a:r>
+          </a:p>
+          <a:p>
+            <a:pPr lvl="2"/>
+            <a:r>
+              <a:rPr lang="en-US" dirty="0"/>
+              <a:t>Preferred Name</a:t>
+            </a:r>
+          </a:p>
+          <a:p>
+            <a:pPr lvl="2"/>
+            <a:r>
+              <a:rPr lang="en-US" dirty="0"/>
+              <a:t>Photo</a:t>
+            </a:r>
+          </a:p>
+          <a:p>
+            <a:pPr lvl="2"/>
+            <a:r>
+              <a:rPr lang="en-US" dirty="0"/>
+              <a:t>Why you took this course and what you hope to get out of it</a:t>
+            </a:r>
+          </a:p>
+          <a:p>
+            <a:pPr lvl="2"/>
+            <a:r>
+              <a:rPr lang="en-US" dirty="0"/>
+              <a:t>The area which you are most interested</a:t>
+            </a:r>
+          </a:p>
+          <a:p>
+            <a:r>
+              <a:rPr lang="en-US" dirty="0"/>
+              <a:t>Reply to at least 2 other’s posts welcoming them.</a:t>
+            </a:r>
+          </a:p>
+          <a:p>
+            <a:endParaRPr lang="en-US" dirty="0"/>
           </a:p>
         </p:txBody>
       </p:sp>
     </p:spTree>
     <p:extLst>
       <p:ext uri="{BB962C8B-B14F-4D97-AF65-F5344CB8AC3E}">
-        <p14:creationId xmlns:p14="http://schemas.microsoft.com/office/powerpoint/2010/main" val="3954877096"/>
+        <p14:creationId xmlns:p14="http://schemas.microsoft.com/office/powerpoint/2010/main" val="3723510670"/>
       </p:ext>
     </p:extLst>
   </p:cSld>

</xml_diff>